<commit_message>
rethingking. adding handled requests to diagramm
</commit_message>
<xml_diff>
--- a/Tests/Präsentation_testergebnisse.pptx
+++ b/Tests/Präsentation_testergebnisse.pptx
@@ -7,7 +7,7 @@
     <p:sldMasterId id="2147483660" r:id="rId6"/>
   </p:sldMasterIdLst>
   <p:notesMasterIdLst>
-    <p:notesMasterId r:id="rId19"/>
+    <p:notesMasterId r:id="rId22"/>
   </p:notesMasterIdLst>
   <p:sldIdLst>
     <p:sldId id="269" r:id="rId7"/>
@@ -22,6 +22,9 @@
     <p:sldId id="290" r:id="rId16"/>
     <p:sldId id="291" r:id="rId17"/>
     <p:sldId id="292" r:id="rId18"/>
+    <p:sldId id="293" r:id="rId19"/>
+    <p:sldId id="294" r:id="rId20"/>
+    <p:sldId id="295" r:id="rId21"/>
   </p:sldIdLst>
   <p:sldSz cx="12192000" cy="6858000"/>
   <p:notesSz cx="6858000" cy="9144000"/>
@@ -17370,6 +17373,1361 @@
 </p:sld>
 </file>
 
+<file path=ppt/slides/slide13.xml><?xml version="1.0" encoding="utf-8"?>
+<p:sld xmlns:a="http://schemas.openxmlformats.org/drawingml/2006/main" xmlns:r="http://schemas.openxmlformats.org/officeDocument/2006/relationships" xmlns:p="http://schemas.openxmlformats.org/presentationml/2006/main">
+  <p:cSld>
+    <p:spTree>
+      <p:nvGrpSpPr>
+        <p:cNvPr id="1" name=""/>
+        <p:cNvGrpSpPr/>
+        <p:nvPr/>
+      </p:nvGrpSpPr>
+      <p:grpSpPr>
+        <a:xfrm>
+          <a:off x="0" y="0"/>
+          <a:ext cx="0" cy="0"/>
+          <a:chOff x="0" y="0"/>
+          <a:chExt cx="0" cy="0"/>
+        </a:xfrm>
+      </p:grpSpPr>
+      <p:sp>
+        <p:nvSpPr>
+          <p:cNvPr id="2" name="Titel 1">
+            <a:extLst>
+              <a:ext uri="{FF2B5EF4-FFF2-40B4-BE49-F238E27FC236}">
+                <a16:creationId xmlns:a16="http://schemas.microsoft.com/office/drawing/2014/main" id="{B22D74DF-2D49-1A74-620A-523203A43A2F}"/>
+              </a:ext>
+            </a:extLst>
+          </p:cNvPr>
+          <p:cNvSpPr>
+            <a:spLocks noGrp="1"/>
+          </p:cNvSpPr>
+          <p:nvPr>
+            <p:ph type="title"/>
+          </p:nvPr>
+        </p:nvSpPr>
+        <p:spPr/>
+        <p:txBody>
+          <a:bodyPr/>
+          <a:lstStyle/>
+          <a:p>
+            <a:r>
+              <a:rPr lang="de-DE" dirty="0"/>
+              <a:t>Ergebnisse</a:t>
+            </a:r>
+          </a:p>
+        </p:txBody>
+      </p:sp>
+      <p:sp>
+        <p:nvSpPr>
+          <p:cNvPr id="8" name="Textplatzhalter 3">
+            <a:extLst>
+              <a:ext uri="{FF2B5EF4-FFF2-40B4-BE49-F238E27FC236}">
+                <a16:creationId xmlns:a16="http://schemas.microsoft.com/office/drawing/2014/main" id="{7308C11C-ACE4-C96A-BC26-915DF956C5C8}"/>
+              </a:ext>
+            </a:extLst>
+          </p:cNvPr>
+          <p:cNvSpPr>
+            <a:spLocks noGrp="1"/>
+          </p:cNvSpPr>
+          <p:nvPr/>
+        </p:nvSpPr>
+        <p:spPr bwMode="auto">
+          <a:xfrm>
+            <a:off x="374723" y="849131"/>
+            <a:ext cx="8820993" cy="504540"/>
+          </a:xfrm>
+          <a:prstGeom prst="rect">
+            <a:avLst/>
+          </a:prstGeom>
+          <a:noFill/>
+          <a:ln>
+            <a:noFill/>
+          </a:ln>
+          <a:extLst>
+            <a:ext uri="{909E8E84-426E-40DD-AFC4-6F175D3DCCD1}">
+              <a14:hiddenFill xmlns:a14="http://schemas.microsoft.com/office/drawing/2010/main">
+                <a:solidFill>
+                  <a:srgbClr val="FFFFFF"/>
+                </a:solidFill>
+              </a14:hiddenFill>
+            </a:ext>
+            <a:ext uri="{91240B29-F687-4F45-9708-019B960494DF}">
+              <a14:hiddenLine xmlns:a14="http://schemas.microsoft.com/office/drawing/2010/main" w="9525">
+                <a:solidFill>
+                  <a:srgbClr val="000000"/>
+                </a:solidFill>
+                <a:miter lim="800000"/>
+                <a:headEnd/>
+                <a:tailEnd/>
+              </a14:hiddenLine>
+            </a:ext>
+          </a:extLst>
+        </p:spPr>
+        <p:txBody>
+          <a:bodyPr vert="horz" wrap="square" lIns="0" tIns="0" rIns="0" bIns="0" numCol="1" anchor="t" anchorCtr="0" compatLnSpc="1">
+            <a:prstTxWarp prst="textNoShape">
+              <a:avLst/>
+            </a:prstTxWarp>
+          </a:bodyPr>
+          <a:lstStyle>
+            <a:lvl1pPr marL="0" indent="0" algn="l" rtl="0" fontAlgn="base">
+              <a:lnSpc>
+                <a:spcPct val="110000"/>
+              </a:lnSpc>
+              <a:spcBef>
+                <a:spcPct val="0"/>
+              </a:spcBef>
+              <a:spcAft>
+                <a:spcPct val="0"/>
+              </a:spcAft>
+              <a:buFont typeface="Arial" panose="020B0604020202020204" pitchFamily="34" charset="0"/>
+              <a:buNone/>
+              <a:defRPr sz="2800" kern="1200">
+                <a:solidFill>
+                  <a:schemeClr val="tx2"/>
+                </a:solidFill>
+                <a:latin typeface="+mn-lt"/>
+                <a:ea typeface="+mn-ea"/>
+                <a:cs typeface="+mn-cs"/>
+              </a:defRPr>
+            </a:lvl1pPr>
+            <a:lvl2pPr marL="984250" indent="-355600" algn="l" rtl="0" fontAlgn="base">
+              <a:lnSpc>
+                <a:spcPct val="110000"/>
+              </a:lnSpc>
+              <a:spcBef>
+                <a:spcPct val="0"/>
+              </a:spcBef>
+              <a:spcAft>
+                <a:spcPct val="0"/>
+              </a:spcAft>
+              <a:buFont typeface="Arial" panose="020B0604020202020204" pitchFamily="34" charset="0"/>
+              <a:buChar char="–"/>
+              <a:defRPr sz="1900" kern="1200">
+                <a:solidFill>
+                  <a:schemeClr val="tx1"/>
+                </a:solidFill>
+                <a:latin typeface="+mn-lt"/>
+                <a:ea typeface="+mn-ea"/>
+                <a:cs typeface="+mn-cs"/>
+              </a:defRPr>
+            </a:lvl2pPr>
+            <a:lvl3pPr marL="1346200" indent="-361950" algn="l" rtl="0" fontAlgn="base">
+              <a:lnSpc>
+                <a:spcPct val="110000"/>
+              </a:lnSpc>
+              <a:spcBef>
+                <a:spcPct val="0"/>
+              </a:spcBef>
+              <a:spcAft>
+                <a:spcPct val="0"/>
+              </a:spcAft>
+              <a:buFont typeface="Arial" panose="020B0604020202020204" pitchFamily="34" charset="0"/>
+              <a:buChar char="–"/>
+              <a:defRPr sz="1900" kern="1200">
+                <a:solidFill>
+                  <a:schemeClr val="tx1"/>
+                </a:solidFill>
+                <a:latin typeface="+mn-lt"/>
+                <a:ea typeface="+mn-ea"/>
+                <a:cs typeface="+mn-cs"/>
+              </a:defRPr>
+            </a:lvl3pPr>
+            <a:lvl4pPr marL="1701800" indent="-355600" algn="l" rtl="0" fontAlgn="base">
+              <a:lnSpc>
+                <a:spcPct val="110000"/>
+              </a:lnSpc>
+              <a:spcBef>
+                <a:spcPct val="0"/>
+              </a:spcBef>
+              <a:spcAft>
+                <a:spcPct val="0"/>
+              </a:spcAft>
+              <a:buFont typeface="Arial" panose="020B0604020202020204" pitchFamily="34" charset="0"/>
+              <a:buChar char="–"/>
+              <a:defRPr sz="1900" kern="1200">
+                <a:solidFill>
+                  <a:schemeClr val="tx1"/>
+                </a:solidFill>
+                <a:latin typeface="+mn-lt"/>
+                <a:ea typeface="+mn-ea"/>
+                <a:cs typeface="+mn-cs"/>
+              </a:defRPr>
+            </a:lvl4pPr>
+            <a:lvl5pPr marL="2063750" indent="-361950" algn="l" rtl="0" fontAlgn="base">
+              <a:lnSpc>
+                <a:spcPct val="110000"/>
+              </a:lnSpc>
+              <a:spcBef>
+                <a:spcPct val="0"/>
+              </a:spcBef>
+              <a:spcAft>
+                <a:spcPct val="0"/>
+              </a:spcAft>
+              <a:buFont typeface="Arial" panose="020B0604020202020204" pitchFamily="34" charset="0"/>
+              <a:buChar char="–"/>
+              <a:defRPr sz="1900" kern="1200">
+                <a:solidFill>
+                  <a:schemeClr val="tx1"/>
+                </a:solidFill>
+                <a:latin typeface="+mn-lt"/>
+                <a:ea typeface="+mn-ea"/>
+                <a:cs typeface="+mn-cs"/>
+              </a:defRPr>
+            </a:lvl5pPr>
+            <a:lvl6pPr marL="2514600" indent="-228600" algn="l" defTabSz="914400" rtl="0" eaLnBrk="1" latinLnBrk="0" hangingPunct="1">
+              <a:lnSpc>
+                <a:spcPct val="90000"/>
+              </a:lnSpc>
+              <a:spcBef>
+                <a:spcPts val="500"/>
+              </a:spcBef>
+              <a:buFont typeface="Arial" panose="020B0604020202020204" pitchFamily="34" charset="0"/>
+              <a:buChar char="•"/>
+              <a:defRPr sz="1800" kern="1200">
+                <a:solidFill>
+                  <a:schemeClr val="tx1"/>
+                </a:solidFill>
+                <a:latin typeface="+mn-lt"/>
+                <a:ea typeface="+mn-ea"/>
+                <a:cs typeface="+mn-cs"/>
+              </a:defRPr>
+            </a:lvl6pPr>
+            <a:lvl7pPr marL="2971800" indent="-228600" algn="l" defTabSz="914400" rtl="0" eaLnBrk="1" latinLnBrk="0" hangingPunct="1">
+              <a:lnSpc>
+                <a:spcPct val="90000"/>
+              </a:lnSpc>
+              <a:spcBef>
+                <a:spcPts val="500"/>
+              </a:spcBef>
+              <a:buFont typeface="Arial" panose="020B0604020202020204" pitchFamily="34" charset="0"/>
+              <a:buChar char="•"/>
+              <a:defRPr sz="1800" kern="1200">
+                <a:solidFill>
+                  <a:schemeClr val="tx1"/>
+                </a:solidFill>
+                <a:latin typeface="+mn-lt"/>
+                <a:ea typeface="+mn-ea"/>
+                <a:cs typeface="+mn-cs"/>
+              </a:defRPr>
+            </a:lvl7pPr>
+            <a:lvl8pPr marL="3429000" indent="-228600" algn="l" defTabSz="914400" rtl="0" eaLnBrk="1" latinLnBrk="0" hangingPunct="1">
+              <a:lnSpc>
+                <a:spcPct val="90000"/>
+              </a:lnSpc>
+              <a:spcBef>
+                <a:spcPts val="500"/>
+              </a:spcBef>
+              <a:buFont typeface="Arial" panose="020B0604020202020204" pitchFamily="34" charset="0"/>
+              <a:buChar char="•"/>
+              <a:defRPr sz="1800" kern="1200">
+                <a:solidFill>
+                  <a:schemeClr val="tx1"/>
+                </a:solidFill>
+                <a:latin typeface="+mn-lt"/>
+                <a:ea typeface="+mn-ea"/>
+                <a:cs typeface="+mn-cs"/>
+              </a:defRPr>
+            </a:lvl8pPr>
+            <a:lvl9pPr marL="3886200" indent="-228600" algn="l" defTabSz="914400" rtl="0" eaLnBrk="1" latinLnBrk="0" hangingPunct="1">
+              <a:lnSpc>
+                <a:spcPct val="90000"/>
+              </a:lnSpc>
+              <a:spcBef>
+                <a:spcPts val="500"/>
+              </a:spcBef>
+              <a:buFont typeface="Arial" panose="020B0604020202020204" pitchFamily="34" charset="0"/>
+              <a:buChar char="•"/>
+              <a:defRPr sz="1800" kern="1200">
+                <a:solidFill>
+                  <a:schemeClr val="tx1"/>
+                </a:solidFill>
+                <a:latin typeface="+mn-lt"/>
+                <a:ea typeface="+mn-ea"/>
+                <a:cs typeface="+mn-cs"/>
+              </a:defRPr>
+            </a:lvl9pPr>
+          </a:lstStyle>
+          <a:p>
+            <a:r>
+              <a:rPr lang="de-DE" dirty="0">
+                <a:cs typeface="Arial"/>
+              </a:rPr>
+              <a:t>Normal</a:t>
+            </a:r>
+            <a:endParaRPr lang="de-DE" dirty="0"/>
+          </a:p>
+        </p:txBody>
+      </p:sp>
+      <p:pic>
+        <p:nvPicPr>
+          <p:cNvPr id="9" name="Grafik 8" descr="Ein Bild, das Text, Reihe, Diagramm, parallel enthält.&#10;&#10;Automatisch generierte Beschreibung">
+            <a:extLst>
+              <a:ext uri="{FF2B5EF4-FFF2-40B4-BE49-F238E27FC236}">
+                <a16:creationId xmlns:a16="http://schemas.microsoft.com/office/drawing/2014/main" id="{BD12FE84-AF94-A660-FF0F-729F60B85A42}"/>
+              </a:ext>
+            </a:extLst>
+          </p:cNvPr>
+          <p:cNvPicPr>
+            <a:picLocks noChangeAspect="1"/>
+          </p:cNvPicPr>
+          <p:nvPr/>
+        </p:nvPicPr>
+        <p:blipFill>
+          <a:blip r:embed="rId2">
+            <a:extLst>
+              <a:ext uri="{28A0092B-C50C-407E-A947-70E740481C1C}">
+                <a14:useLocalDpi xmlns:a14="http://schemas.microsoft.com/office/drawing/2010/main" val="0"/>
+              </a:ext>
+            </a:extLst>
+          </a:blip>
+          <a:stretch>
+            <a:fillRect/>
+          </a:stretch>
+        </p:blipFill>
+        <p:spPr>
+          <a:xfrm>
+            <a:off x="1498142" y="1546063"/>
+            <a:ext cx="9195716" cy="4631384"/>
+          </a:xfrm>
+          <a:prstGeom prst="rect">
+            <a:avLst/>
+          </a:prstGeom>
+        </p:spPr>
+      </p:pic>
+      <p:sp>
+        <p:nvSpPr>
+          <p:cNvPr id="10" name="Sprechblase: oval 9">
+            <a:extLst>
+              <a:ext uri="{FF2B5EF4-FFF2-40B4-BE49-F238E27FC236}">
+                <a16:creationId xmlns:a16="http://schemas.microsoft.com/office/drawing/2014/main" id="{BDEB5EDA-AB70-E00C-D5D9-A6C4A61580D6}"/>
+              </a:ext>
+            </a:extLst>
+          </p:cNvPr>
+          <p:cNvSpPr/>
+          <p:nvPr/>
+        </p:nvSpPr>
+        <p:spPr bwMode="auto">
+          <a:xfrm>
+            <a:off x="8246853" y="1571072"/>
+            <a:ext cx="1431986" cy="562630"/>
+          </a:xfrm>
+          <a:prstGeom prst="wedgeEllipseCallout">
+            <a:avLst>
+              <a:gd name="adj1" fmla="val 22245"/>
+              <a:gd name="adj2" fmla="val 69974"/>
+            </a:avLst>
+          </a:prstGeom>
+          <a:ln/>
+        </p:spPr>
+        <p:style>
+          <a:lnRef idx="2">
+            <a:schemeClr val="accent2"/>
+          </a:lnRef>
+          <a:fillRef idx="1">
+            <a:schemeClr val="lt1"/>
+          </a:fillRef>
+          <a:effectRef idx="0">
+            <a:schemeClr val="accent2"/>
+          </a:effectRef>
+          <a:fontRef idx="minor">
+            <a:schemeClr val="dk1"/>
+          </a:fontRef>
+        </p:style>
+        <p:txBody>
+          <a:bodyPr vert="horz" wrap="square" lIns="91440" tIns="45720" rIns="91440" bIns="45720" numCol="1" rtlCol="0" anchor="ctr" anchorCtr="0" compatLnSpc="1">
+            <a:prstTxWarp prst="textNoShape">
+              <a:avLst/>
+            </a:prstTxWarp>
+            <a:spAutoFit/>
+          </a:bodyPr>
+          <a:lstStyle/>
+          <a:p>
+            <a:pPr marL="0" marR="0" indent="0" algn="l" defTabSz="914400" rtl="0" eaLnBrk="0" fontAlgn="base" latinLnBrk="0" hangingPunct="0">
+              <a:lnSpc>
+                <a:spcPct val="100000"/>
+              </a:lnSpc>
+              <a:spcBef>
+                <a:spcPct val="0"/>
+              </a:spcBef>
+              <a:spcAft>
+                <a:spcPct val="0"/>
+              </a:spcAft>
+              <a:buClrTx/>
+              <a:buSzTx/>
+              <a:buFontTx/>
+              <a:buNone/>
+              <a:tabLst/>
+            </a:pPr>
+            <a:r>
+              <a:rPr kumimoji="0" lang="de-DE" sz="1000" b="1" i="0" u="none" strike="noStrike" cap="none" normalizeH="0" baseline="0" dirty="0">
+                <a:ln>
+                  <a:noFill/>
+                </a:ln>
+                <a:solidFill>
+                  <a:srgbClr val="000080"/>
+                </a:solidFill>
+                <a:effectLst/>
+                <a:latin typeface="Consolas" panose="020B0609020204030204" pitchFamily="49" charset="0"/>
+              </a:rPr>
+              <a:t>Crash bei </a:t>
+            </a:r>
+            <a:br>
+              <a:rPr kumimoji="0" lang="de-DE" sz="1000" b="1" i="0" u="none" strike="noStrike" cap="none" normalizeH="0" baseline="0" dirty="0">
+                <a:ln>
+                  <a:noFill/>
+                </a:ln>
+                <a:solidFill>
+                  <a:srgbClr val="000080"/>
+                </a:solidFill>
+                <a:effectLst/>
+                <a:latin typeface="Consolas" panose="020B0609020204030204" pitchFamily="49" charset="0"/>
+              </a:rPr>
+            </a:br>
+            <a:r>
+              <a:rPr kumimoji="0" lang="de-DE" sz="1000" b="1" i="0" u="none" strike="noStrike" cap="none" normalizeH="0" baseline="0" dirty="0">
+                <a:ln>
+                  <a:noFill/>
+                </a:ln>
+                <a:solidFill>
+                  <a:srgbClr val="000080"/>
+                </a:solidFill>
+                <a:effectLst/>
+                <a:latin typeface="Consolas" panose="020B0609020204030204" pitchFamily="49" charset="0"/>
+              </a:rPr>
+              <a:t>4700 </a:t>
+            </a:r>
+            <a:r>
+              <a:rPr kumimoji="0" lang="de-DE" sz="1000" b="1" i="0" u="none" strike="noStrike" cap="none" normalizeH="0" baseline="0" dirty="0" err="1">
+                <a:ln>
+                  <a:noFill/>
+                </a:ln>
+                <a:solidFill>
+                  <a:srgbClr val="000080"/>
+                </a:solidFill>
+                <a:effectLst/>
+                <a:latin typeface="Consolas" panose="020B0609020204030204" pitchFamily="49" charset="0"/>
+              </a:rPr>
+              <a:t>vus</a:t>
+            </a:r>
+            <a:endParaRPr kumimoji="0" lang="de-DE" sz="1000" b="1" i="0" u="none" strike="noStrike" cap="none" normalizeH="0" baseline="0" dirty="0">
+              <a:ln>
+                <a:noFill/>
+              </a:ln>
+              <a:solidFill>
+                <a:srgbClr val="000080"/>
+              </a:solidFill>
+              <a:effectLst/>
+              <a:latin typeface="Consolas" panose="020B0609020204030204" pitchFamily="49" charset="0"/>
+            </a:endParaRPr>
+          </a:p>
+        </p:txBody>
+      </p:sp>
+    </p:spTree>
+    <p:extLst>
+      <p:ext uri="{BB962C8B-B14F-4D97-AF65-F5344CB8AC3E}">
+        <p14:creationId xmlns:p14="http://schemas.microsoft.com/office/powerpoint/2010/main" val="3353380257"/>
+      </p:ext>
+    </p:extLst>
+  </p:cSld>
+  <p:clrMapOvr>
+    <a:masterClrMapping/>
+  </p:clrMapOvr>
+  <mc:AlternateContent xmlns:mc="http://schemas.openxmlformats.org/markup-compatibility/2006">
+    <mc:Choice xmlns:p14="http://schemas.microsoft.com/office/powerpoint/2010/main" Requires="p14">
+      <p:transition spd="med" p14:dur="700">
+        <p:fade/>
+      </p:transition>
+    </mc:Choice>
+    <mc:Fallback>
+      <p:transition spd="med">
+        <p:fade/>
+      </p:transition>
+    </mc:Fallback>
+  </mc:AlternateContent>
+</p:sld>
+</file>
+
+<file path=ppt/slides/slide14.xml><?xml version="1.0" encoding="utf-8"?>
+<p:sld xmlns:a="http://schemas.openxmlformats.org/drawingml/2006/main" xmlns:r="http://schemas.openxmlformats.org/officeDocument/2006/relationships" xmlns:p="http://schemas.openxmlformats.org/presentationml/2006/main">
+  <p:cSld>
+    <p:spTree>
+      <p:nvGrpSpPr>
+        <p:cNvPr id="1" name=""/>
+        <p:cNvGrpSpPr/>
+        <p:nvPr/>
+      </p:nvGrpSpPr>
+      <p:grpSpPr>
+        <a:xfrm>
+          <a:off x="0" y="0"/>
+          <a:ext cx="0" cy="0"/>
+          <a:chOff x="0" y="0"/>
+          <a:chExt cx="0" cy="0"/>
+        </a:xfrm>
+      </p:grpSpPr>
+      <p:sp>
+        <p:nvSpPr>
+          <p:cNvPr id="2" name="Titel 1">
+            <a:extLst>
+              <a:ext uri="{FF2B5EF4-FFF2-40B4-BE49-F238E27FC236}">
+                <a16:creationId xmlns:a16="http://schemas.microsoft.com/office/drawing/2014/main" id="{B22D74DF-2D49-1A74-620A-523203A43A2F}"/>
+              </a:ext>
+            </a:extLst>
+          </p:cNvPr>
+          <p:cNvSpPr>
+            <a:spLocks noGrp="1"/>
+          </p:cNvSpPr>
+          <p:nvPr>
+            <p:ph type="title"/>
+          </p:nvPr>
+        </p:nvSpPr>
+        <p:spPr/>
+        <p:txBody>
+          <a:bodyPr/>
+          <a:lstStyle/>
+          <a:p>
+            <a:r>
+              <a:rPr lang="de-DE" dirty="0"/>
+              <a:t>Ergebnisse</a:t>
+            </a:r>
+          </a:p>
+        </p:txBody>
+      </p:sp>
+      <p:sp>
+        <p:nvSpPr>
+          <p:cNvPr id="8" name="Textplatzhalter 3">
+            <a:extLst>
+              <a:ext uri="{FF2B5EF4-FFF2-40B4-BE49-F238E27FC236}">
+                <a16:creationId xmlns:a16="http://schemas.microsoft.com/office/drawing/2014/main" id="{7308C11C-ACE4-C96A-BC26-915DF956C5C8}"/>
+              </a:ext>
+            </a:extLst>
+          </p:cNvPr>
+          <p:cNvSpPr>
+            <a:spLocks noGrp="1"/>
+          </p:cNvSpPr>
+          <p:nvPr/>
+        </p:nvSpPr>
+        <p:spPr bwMode="auto">
+          <a:xfrm>
+            <a:off x="374723" y="849131"/>
+            <a:ext cx="8820993" cy="504540"/>
+          </a:xfrm>
+          <a:prstGeom prst="rect">
+            <a:avLst/>
+          </a:prstGeom>
+          <a:noFill/>
+          <a:ln>
+            <a:noFill/>
+          </a:ln>
+          <a:extLst>
+            <a:ext uri="{909E8E84-426E-40DD-AFC4-6F175D3DCCD1}">
+              <a14:hiddenFill xmlns:a14="http://schemas.microsoft.com/office/drawing/2010/main">
+                <a:solidFill>
+                  <a:srgbClr val="FFFFFF"/>
+                </a:solidFill>
+              </a14:hiddenFill>
+            </a:ext>
+            <a:ext uri="{91240B29-F687-4F45-9708-019B960494DF}">
+              <a14:hiddenLine xmlns:a14="http://schemas.microsoft.com/office/drawing/2010/main" w="9525">
+                <a:solidFill>
+                  <a:srgbClr val="000000"/>
+                </a:solidFill>
+                <a:miter lim="800000"/>
+                <a:headEnd/>
+                <a:tailEnd/>
+              </a14:hiddenLine>
+            </a:ext>
+          </a:extLst>
+        </p:spPr>
+        <p:txBody>
+          <a:bodyPr vert="horz" wrap="square" lIns="0" tIns="0" rIns="0" bIns="0" numCol="1" anchor="t" anchorCtr="0" compatLnSpc="1">
+            <a:prstTxWarp prst="textNoShape">
+              <a:avLst/>
+            </a:prstTxWarp>
+          </a:bodyPr>
+          <a:lstStyle>
+            <a:lvl1pPr marL="0" indent="0" algn="l" rtl="0" fontAlgn="base">
+              <a:lnSpc>
+                <a:spcPct val="110000"/>
+              </a:lnSpc>
+              <a:spcBef>
+                <a:spcPct val="0"/>
+              </a:spcBef>
+              <a:spcAft>
+                <a:spcPct val="0"/>
+              </a:spcAft>
+              <a:buFont typeface="Arial" panose="020B0604020202020204" pitchFamily="34" charset="0"/>
+              <a:buNone/>
+              <a:defRPr sz="2800" kern="1200">
+                <a:solidFill>
+                  <a:schemeClr val="tx2"/>
+                </a:solidFill>
+                <a:latin typeface="+mn-lt"/>
+                <a:ea typeface="+mn-ea"/>
+                <a:cs typeface="+mn-cs"/>
+              </a:defRPr>
+            </a:lvl1pPr>
+            <a:lvl2pPr marL="984250" indent="-355600" algn="l" rtl="0" fontAlgn="base">
+              <a:lnSpc>
+                <a:spcPct val="110000"/>
+              </a:lnSpc>
+              <a:spcBef>
+                <a:spcPct val="0"/>
+              </a:spcBef>
+              <a:spcAft>
+                <a:spcPct val="0"/>
+              </a:spcAft>
+              <a:buFont typeface="Arial" panose="020B0604020202020204" pitchFamily="34" charset="0"/>
+              <a:buChar char="–"/>
+              <a:defRPr sz="1900" kern="1200">
+                <a:solidFill>
+                  <a:schemeClr val="tx1"/>
+                </a:solidFill>
+                <a:latin typeface="+mn-lt"/>
+                <a:ea typeface="+mn-ea"/>
+                <a:cs typeface="+mn-cs"/>
+              </a:defRPr>
+            </a:lvl2pPr>
+            <a:lvl3pPr marL="1346200" indent="-361950" algn="l" rtl="0" fontAlgn="base">
+              <a:lnSpc>
+                <a:spcPct val="110000"/>
+              </a:lnSpc>
+              <a:spcBef>
+                <a:spcPct val="0"/>
+              </a:spcBef>
+              <a:spcAft>
+                <a:spcPct val="0"/>
+              </a:spcAft>
+              <a:buFont typeface="Arial" panose="020B0604020202020204" pitchFamily="34" charset="0"/>
+              <a:buChar char="–"/>
+              <a:defRPr sz="1900" kern="1200">
+                <a:solidFill>
+                  <a:schemeClr val="tx1"/>
+                </a:solidFill>
+                <a:latin typeface="+mn-lt"/>
+                <a:ea typeface="+mn-ea"/>
+                <a:cs typeface="+mn-cs"/>
+              </a:defRPr>
+            </a:lvl3pPr>
+            <a:lvl4pPr marL="1701800" indent="-355600" algn="l" rtl="0" fontAlgn="base">
+              <a:lnSpc>
+                <a:spcPct val="110000"/>
+              </a:lnSpc>
+              <a:spcBef>
+                <a:spcPct val="0"/>
+              </a:spcBef>
+              <a:spcAft>
+                <a:spcPct val="0"/>
+              </a:spcAft>
+              <a:buFont typeface="Arial" panose="020B0604020202020204" pitchFamily="34" charset="0"/>
+              <a:buChar char="–"/>
+              <a:defRPr sz="1900" kern="1200">
+                <a:solidFill>
+                  <a:schemeClr val="tx1"/>
+                </a:solidFill>
+                <a:latin typeface="+mn-lt"/>
+                <a:ea typeface="+mn-ea"/>
+                <a:cs typeface="+mn-cs"/>
+              </a:defRPr>
+            </a:lvl4pPr>
+            <a:lvl5pPr marL="2063750" indent="-361950" algn="l" rtl="0" fontAlgn="base">
+              <a:lnSpc>
+                <a:spcPct val="110000"/>
+              </a:lnSpc>
+              <a:spcBef>
+                <a:spcPct val="0"/>
+              </a:spcBef>
+              <a:spcAft>
+                <a:spcPct val="0"/>
+              </a:spcAft>
+              <a:buFont typeface="Arial" panose="020B0604020202020204" pitchFamily="34" charset="0"/>
+              <a:buChar char="–"/>
+              <a:defRPr sz="1900" kern="1200">
+                <a:solidFill>
+                  <a:schemeClr val="tx1"/>
+                </a:solidFill>
+                <a:latin typeface="+mn-lt"/>
+                <a:ea typeface="+mn-ea"/>
+                <a:cs typeface="+mn-cs"/>
+              </a:defRPr>
+            </a:lvl5pPr>
+            <a:lvl6pPr marL="2514600" indent="-228600" algn="l" defTabSz="914400" rtl="0" eaLnBrk="1" latinLnBrk="0" hangingPunct="1">
+              <a:lnSpc>
+                <a:spcPct val="90000"/>
+              </a:lnSpc>
+              <a:spcBef>
+                <a:spcPts val="500"/>
+              </a:spcBef>
+              <a:buFont typeface="Arial" panose="020B0604020202020204" pitchFamily="34" charset="0"/>
+              <a:buChar char="•"/>
+              <a:defRPr sz="1800" kern="1200">
+                <a:solidFill>
+                  <a:schemeClr val="tx1"/>
+                </a:solidFill>
+                <a:latin typeface="+mn-lt"/>
+                <a:ea typeface="+mn-ea"/>
+                <a:cs typeface="+mn-cs"/>
+              </a:defRPr>
+            </a:lvl6pPr>
+            <a:lvl7pPr marL="2971800" indent="-228600" algn="l" defTabSz="914400" rtl="0" eaLnBrk="1" latinLnBrk="0" hangingPunct="1">
+              <a:lnSpc>
+                <a:spcPct val="90000"/>
+              </a:lnSpc>
+              <a:spcBef>
+                <a:spcPts val="500"/>
+              </a:spcBef>
+              <a:buFont typeface="Arial" panose="020B0604020202020204" pitchFamily="34" charset="0"/>
+              <a:buChar char="•"/>
+              <a:defRPr sz="1800" kern="1200">
+                <a:solidFill>
+                  <a:schemeClr val="tx1"/>
+                </a:solidFill>
+                <a:latin typeface="+mn-lt"/>
+                <a:ea typeface="+mn-ea"/>
+                <a:cs typeface="+mn-cs"/>
+              </a:defRPr>
+            </a:lvl7pPr>
+            <a:lvl8pPr marL="3429000" indent="-228600" algn="l" defTabSz="914400" rtl="0" eaLnBrk="1" latinLnBrk="0" hangingPunct="1">
+              <a:lnSpc>
+                <a:spcPct val="90000"/>
+              </a:lnSpc>
+              <a:spcBef>
+                <a:spcPts val="500"/>
+              </a:spcBef>
+              <a:buFont typeface="Arial" panose="020B0604020202020204" pitchFamily="34" charset="0"/>
+              <a:buChar char="•"/>
+              <a:defRPr sz="1800" kern="1200">
+                <a:solidFill>
+                  <a:schemeClr val="tx1"/>
+                </a:solidFill>
+                <a:latin typeface="+mn-lt"/>
+                <a:ea typeface="+mn-ea"/>
+                <a:cs typeface="+mn-cs"/>
+              </a:defRPr>
+            </a:lvl8pPr>
+            <a:lvl9pPr marL="3886200" indent="-228600" algn="l" defTabSz="914400" rtl="0" eaLnBrk="1" latinLnBrk="0" hangingPunct="1">
+              <a:lnSpc>
+                <a:spcPct val="90000"/>
+              </a:lnSpc>
+              <a:spcBef>
+                <a:spcPts val="500"/>
+              </a:spcBef>
+              <a:buFont typeface="Arial" panose="020B0604020202020204" pitchFamily="34" charset="0"/>
+              <a:buChar char="•"/>
+              <a:defRPr sz="1800" kern="1200">
+                <a:solidFill>
+                  <a:schemeClr val="tx1"/>
+                </a:solidFill>
+                <a:latin typeface="+mn-lt"/>
+                <a:ea typeface="+mn-ea"/>
+                <a:cs typeface="+mn-cs"/>
+              </a:defRPr>
+            </a:lvl9pPr>
+          </a:lstStyle>
+          <a:p>
+            <a:r>
+              <a:rPr lang="de-DE" dirty="0">
+                <a:cs typeface="Arial"/>
+              </a:rPr>
+              <a:t>Virtual</a:t>
+            </a:r>
+            <a:endParaRPr lang="de-DE" dirty="0"/>
+          </a:p>
+        </p:txBody>
+      </p:sp>
+      <p:pic>
+        <p:nvPicPr>
+          <p:cNvPr id="4" name="Grafik 3" descr="Ein Bild, das Text, Reihe, Diagramm, parallel enthält.&#10;&#10;Automatisch generierte Beschreibung">
+            <a:extLst>
+              <a:ext uri="{FF2B5EF4-FFF2-40B4-BE49-F238E27FC236}">
+                <a16:creationId xmlns:a16="http://schemas.microsoft.com/office/drawing/2014/main" id="{EFDCB799-D4DB-B5BE-C72B-D9788E6628C4}"/>
+              </a:ext>
+            </a:extLst>
+          </p:cNvPr>
+          <p:cNvPicPr>
+            <a:picLocks noChangeAspect="1"/>
+          </p:cNvPicPr>
+          <p:nvPr/>
+        </p:nvPicPr>
+        <p:blipFill>
+          <a:blip r:embed="rId2">
+            <a:extLst>
+              <a:ext uri="{28A0092B-C50C-407E-A947-70E740481C1C}">
+                <a14:useLocalDpi xmlns:a14="http://schemas.microsoft.com/office/drawing/2010/main" val="0"/>
+              </a:ext>
+            </a:extLst>
+          </a:blip>
+          <a:stretch>
+            <a:fillRect/>
+          </a:stretch>
+        </p:blipFill>
+        <p:spPr>
+          <a:xfrm>
+            <a:off x="1372181" y="1500675"/>
+            <a:ext cx="9039901" cy="4552909"/>
+          </a:xfrm>
+          <a:prstGeom prst="rect">
+            <a:avLst/>
+          </a:prstGeom>
+        </p:spPr>
+      </p:pic>
+      <p:sp>
+        <p:nvSpPr>
+          <p:cNvPr id="5" name="Sprechblase: oval 4">
+            <a:extLst>
+              <a:ext uri="{FF2B5EF4-FFF2-40B4-BE49-F238E27FC236}">
+                <a16:creationId xmlns:a16="http://schemas.microsoft.com/office/drawing/2014/main" id="{55FBA520-9270-8559-179D-8F1D7E9B99BB}"/>
+              </a:ext>
+            </a:extLst>
+          </p:cNvPr>
+          <p:cNvSpPr/>
+          <p:nvPr/>
+        </p:nvSpPr>
+        <p:spPr bwMode="auto">
+          <a:xfrm>
+            <a:off x="8246853" y="1500675"/>
+            <a:ext cx="1431986" cy="562630"/>
+          </a:xfrm>
+          <a:prstGeom prst="wedgeEllipseCallout">
+            <a:avLst>
+              <a:gd name="adj1" fmla="val 17426"/>
+              <a:gd name="adj2" fmla="val 68441"/>
+            </a:avLst>
+          </a:prstGeom>
+          <a:ln/>
+        </p:spPr>
+        <p:style>
+          <a:lnRef idx="2">
+            <a:schemeClr val="accent2"/>
+          </a:lnRef>
+          <a:fillRef idx="1">
+            <a:schemeClr val="lt1"/>
+          </a:fillRef>
+          <a:effectRef idx="0">
+            <a:schemeClr val="accent2"/>
+          </a:effectRef>
+          <a:fontRef idx="minor">
+            <a:schemeClr val="dk1"/>
+          </a:fontRef>
+        </p:style>
+        <p:txBody>
+          <a:bodyPr vert="horz" wrap="square" lIns="91440" tIns="45720" rIns="91440" bIns="45720" numCol="1" rtlCol="0" anchor="ctr" anchorCtr="0" compatLnSpc="1">
+            <a:prstTxWarp prst="textNoShape">
+              <a:avLst/>
+            </a:prstTxWarp>
+            <a:spAutoFit/>
+          </a:bodyPr>
+          <a:lstStyle/>
+          <a:p>
+            <a:pPr marL="0" marR="0" indent="0" algn="l" defTabSz="914400" rtl="0" eaLnBrk="0" fontAlgn="base" latinLnBrk="0" hangingPunct="0">
+              <a:lnSpc>
+                <a:spcPct val="100000"/>
+              </a:lnSpc>
+              <a:spcBef>
+                <a:spcPct val="0"/>
+              </a:spcBef>
+              <a:spcAft>
+                <a:spcPct val="0"/>
+              </a:spcAft>
+              <a:buClrTx/>
+              <a:buSzTx/>
+              <a:buFontTx/>
+              <a:buNone/>
+              <a:tabLst/>
+            </a:pPr>
+            <a:r>
+              <a:rPr kumimoji="0" lang="de-DE" sz="1000" b="1" i="0" u="none" strike="noStrike" cap="none" normalizeH="0" baseline="0" dirty="0">
+                <a:ln>
+                  <a:noFill/>
+                </a:ln>
+                <a:solidFill>
+                  <a:srgbClr val="000080"/>
+                </a:solidFill>
+                <a:effectLst/>
+                <a:latin typeface="Consolas" panose="020B0609020204030204" pitchFamily="49" charset="0"/>
+              </a:rPr>
+              <a:t>Java </a:t>
+            </a:r>
+            <a:r>
+              <a:rPr kumimoji="0" lang="de-DE" sz="1000" b="1" i="0" u="none" strike="noStrike" cap="none" normalizeH="0" baseline="0" dirty="0" err="1">
+                <a:ln>
+                  <a:noFill/>
+                </a:ln>
+                <a:solidFill>
+                  <a:srgbClr val="000080"/>
+                </a:solidFill>
+                <a:effectLst/>
+                <a:latin typeface="Consolas" panose="020B0609020204030204" pitchFamily="49" charset="0"/>
+              </a:rPr>
+              <a:t>OutOfHeap</a:t>
+            </a:r>
+            <a:endParaRPr kumimoji="0" lang="de-DE" sz="1000" b="1" i="0" u="none" strike="noStrike" cap="none" normalizeH="0" baseline="0" dirty="0">
+              <a:ln>
+                <a:noFill/>
+              </a:ln>
+              <a:solidFill>
+                <a:srgbClr val="000080"/>
+              </a:solidFill>
+              <a:effectLst/>
+              <a:latin typeface="Consolas" panose="020B0609020204030204" pitchFamily="49" charset="0"/>
+            </a:endParaRPr>
+          </a:p>
+        </p:txBody>
+      </p:sp>
+    </p:spTree>
+    <p:extLst>
+      <p:ext uri="{BB962C8B-B14F-4D97-AF65-F5344CB8AC3E}">
+        <p14:creationId xmlns:p14="http://schemas.microsoft.com/office/powerpoint/2010/main" val="1093798466"/>
+      </p:ext>
+    </p:extLst>
+  </p:cSld>
+  <p:clrMapOvr>
+    <a:masterClrMapping/>
+  </p:clrMapOvr>
+  <mc:AlternateContent xmlns:mc="http://schemas.openxmlformats.org/markup-compatibility/2006">
+    <mc:Choice xmlns:p14="http://schemas.microsoft.com/office/powerpoint/2010/main" Requires="p14">
+      <p:transition spd="med" p14:dur="700">
+        <p:fade/>
+      </p:transition>
+    </mc:Choice>
+    <mc:Fallback>
+      <p:transition spd="med">
+        <p:fade/>
+      </p:transition>
+    </mc:Fallback>
+  </mc:AlternateContent>
+</p:sld>
+</file>
+
+<file path=ppt/slides/slide15.xml><?xml version="1.0" encoding="utf-8"?>
+<p:sld xmlns:a="http://schemas.openxmlformats.org/drawingml/2006/main" xmlns:r="http://schemas.openxmlformats.org/officeDocument/2006/relationships" xmlns:p="http://schemas.openxmlformats.org/presentationml/2006/main">
+  <p:cSld>
+    <p:spTree>
+      <p:nvGrpSpPr>
+        <p:cNvPr id="1" name=""/>
+        <p:cNvGrpSpPr/>
+        <p:nvPr/>
+      </p:nvGrpSpPr>
+      <p:grpSpPr>
+        <a:xfrm>
+          <a:off x="0" y="0"/>
+          <a:ext cx="0" cy="0"/>
+          <a:chOff x="0" y="0"/>
+          <a:chExt cx="0" cy="0"/>
+        </a:xfrm>
+      </p:grpSpPr>
+      <p:sp>
+        <p:nvSpPr>
+          <p:cNvPr id="2" name="Titel 1">
+            <a:extLst>
+              <a:ext uri="{FF2B5EF4-FFF2-40B4-BE49-F238E27FC236}">
+                <a16:creationId xmlns:a16="http://schemas.microsoft.com/office/drawing/2014/main" id="{B22D74DF-2D49-1A74-620A-523203A43A2F}"/>
+              </a:ext>
+            </a:extLst>
+          </p:cNvPr>
+          <p:cNvSpPr>
+            <a:spLocks noGrp="1"/>
+          </p:cNvSpPr>
+          <p:nvPr>
+            <p:ph type="title"/>
+          </p:nvPr>
+        </p:nvSpPr>
+        <p:spPr/>
+        <p:txBody>
+          <a:bodyPr/>
+          <a:lstStyle/>
+          <a:p>
+            <a:r>
+              <a:rPr lang="de-DE" dirty="0"/>
+              <a:t>Ergebnisse</a:t>
+            </a:r>
+          </a:p>
+        </p:txBody>
+      </p:sp>
+      <p:sp>
+        <p:nvSpPr>
+          <p:cNvPr id="8" name="Textplatzhalter 3">
+            <a:extLst>
+              <a:ext uri="{FF2B5EF4-FFF2-40B4-BE49-F238E27FC236}">
+                <a16:creationId xmlns:a16="http://schemas.microsoft.com/office/drawing/2014/main" id="{7308C11C-ACE4-C96A-BC26-915DF956C5C8}"/>
+              </a:ext>
+            </a:extLst>
+          </p:cNvPr>
+          <p:cNvSpPr>
+            <a:spLocks noGrp="1"/>
+          </p:cNvSpPr>
+          <p:nvPr/>
+        </p:nvSpPr>
+        <p:spPr bwMode="auto">
+          <a:xfrm>
+            <a:off x="374723" y="849131"/>
+            <a:ext cx="8820993" cy="504540"/>
+          </a:xfrm>
+          <a:prstGeom prst="rect">
+            <a:avLst/>
+          </a:prstGeom>
+          <a:noFill/>
+          <a:ln>
+            <a:noFill/>
+          </a:ln>
+          <a:extLst>
+            <a:ext uri="{909E8E84-426E-40DD-AFC4-6F175D3DCCD1}">
+              <a14:hiddenFill xmlns:a14="http://schemas.microsoft.com/office/drawing/2010/main">
+                <a:solidFill>
+                  <a:srgbClr val="FFFFFF"/>
+                </a:solidFill>
+              </a14:hiddenFill>
+            </a:ext>
+            <a:ext uri="{91240B29-F687-4F45-9708-019B960494DF}">
+              <a14:hiddenLine xmlns:a14="http://schemas.microsoft.com/office/drawing/2010/main" w="9525">
+                <a:solidFill>
+                  <a:srgbClr val="000000"/>
+                </a:solidFill>
+                <a:miter lim="800000"/>
+                <a:headEnd/>
+                <a:tailEnd/>
+              </a14:hiddenLine>
+            </a:ext>
+          </a:extLst>
+        </p:spPr>
+        <p:txBody>
+          <a:bodyPr vert="horz" wrap="square" lIns="0" tIns="0" rIns="0" bIns="0" numCol="1" anchor="t" anchorCtr="0" compatLnSpc="1">
+            <a:prstTxWarp prst="textNoShape">
+              <a:avLst/>
+            </a:prstTxWarp>
+          </a:bodyPr>
+          <a:lstStyle>
+            <a:lvl1pPr marL="0" indent="0" algn="l" rtl="0" fontAlgn="base">
+              <a:lnSpc>
+                <a:spcPct val="110000"/>
+              </a:lnSpc>
+              <a:spcBef>
+                <a:spcPct val="0"/>
+              </a:spcBef>
+              <a:spcAft>
+                <a:spcPct val="0"/>
+              </a:spcAft>
+              <a:buFont typeface="Arial" panose="020B0604020202020204" pitchFamily="34" charset="0"/>
+              <a:buNone/>
+              <a:defRPr sz="2800" kern="1200">
+                <a:solidFill>
+                  <a:schemeClr val="tx2"/>
+                </a:solidFill>
+                <a:latin typeface="+mn-lt"/>
+                <a:ea typeface="+mn-ea"/>
+                <a:cs typeface="+mn-cs"/>
+              </a:defRPr>
+            </a:lvl1pPr>
+            <a:lvl2pPr marL="984250" indent="-355600" algn="l" rtl="0" fontAlgn="base">
+              <a:lnSpc>
+                <a:spcPct val="110000"/>
+              </a:lnSpc>
+              <a:spcBef>
+                <a:spcPct val="0"/>
+              </a:spcBef>
+              <a:spcAft>
+                <a:spcPct val="0"/>
+              </a:spcAft>
+              <a:buFont typeface="Arial" panose="020B0604020202020204" pitchFamily="34" charset="0"/>
+              <a:buChar char="–"/>
+              <a:defRPr sz="1900" kern="1200">
+                <a:solidFill>
+                  <a:schemeClr val="tx1"/>
+                </a:solidFill>
+                <a:latin typeface="+mn-lt"/>
+                <a:ea typeface="+mn-ea"/>
+                <a:cs typeface="+mn-cs"/>
+              </a:defRPr>
+            </a:lvl2pPr>
+            <a:lvl3pPr marL="1346200" indent="-361950" algn="l" rtl="0" fontAlgn="base">
+              <a:lnSpc>
+                <a:spcPct val="110000"/>
+              </a:lnSpc>
+              <a:spcBef>
+                <a:spcPct val="0"/>
+              </a:spcBef>
+              <a:spcAft>
+                <a:spcPct val="0"/>
+              </a:spcAft>
+              <a:buFont typeface="Arial" panose="020B0604020202020204" pitchFamily="34" charset="0"/>
+              <a:buChar char="–"/>
+              <a:defRPr sz="1900" kern="1200">
+                <a:solidFill>
+                  <a:schemeClr val="tx1"/>
+                </a:solidFill>
+                <a:latin typeface="+mn-lt"/>
+                <a:ea typeface="+mn-ea"/>
+                <a:cs typeface="+mn-cs"/>
+              </a:defRPr>
+            </a:lvl3pPr>
+            <a:lvl4pPr marL="1701800" indent="-355600" algn="l" rtl="0" fontAlgn="base">
+              <a:lnSpc>
+                <a:spcPct val="110000"/>
+              </a:lnSpc>
+              <a:spcBef>
+                <a:spcPct val="0"/>
+              </a:spcBef>
+              <a:spcAft>
+                <a:spcPct val="0"/>
+              </a:spcAft>
+              <a:buFont typeface="Arial" panose="020B0604020202020204" pitchFamily="34" charset="0"/>
+              <a:buChar char="–"/>
+              <a:defRPr sz="1900" kern="1200">
+                <a:solidFill>
+                  <a:schemeClr val="tx1"/>
+                </a:solidFill>
+                <a:latin typeface="+mn-lt"/>
+                <a:ea typeface="+mn-ea"/>
+                <a:cs typeface="+mn-cs"/>
+              </a:defRPr>
+            </a:lvl4pPr>
+            <a:lvl5pPr marL="2063750" indent="-361950" algn="l" rtl="0" fontAlgn="base">
+              <a:lnSpc>
+                <a:spcPct val="110000"/>
+              </a:lnSpc>
+              <a:spcBef>
+                <a:spcPct val="0"/>
+              </a:spcBef>
+              <a:spcAft>
+                <a:spcPct val="0"/>
+              </a:spcAft>
+              <a:buFont typeface="Arial" panose="020B0604020202020204" pitchFamily="34" charset="0"/>
+              <a:buChar char="–"/>
+              <a:defRPr sz="1900" kern="1200">
+                <a:solidFill>
+                  <a:schemeClr val="tx1"/>
+                </a:solidFill>
+                <a:latin typeface="+mn-lt"/>
+                <a:ea typeface="+mn-ea"/>
+                <a:cs typeface="+mn-cs"/>
+              </a:defRPr>
+            </a:lvl5pPr>
+            <a:lvl6pPr marL="2514600" indent="-228600" algn="l" defTabSz="914400" rtl="0" eaLnBrk="1" latinLnBrk="0" hangingPunct="1">
+              <a:lnSpc>
+                <a:spcPct val="90000"/>
+              </a:lnSpc>
+              <a:spcBef>
+                <a:spcPts val="500"/>
+              </a:spcBef>
+              <a:buFont typeface="Arial" panose="020B0604020202020204" pitchFamily="34" charset="0"/>
+              <a:buChar char="•"/>
+              <a:defRPr sz="1800" kern="1200">
+                <a:solidFill>
+                  <a:schemeClr val="tx1"/>
+                </a:solidFill>
+                <a:latin typeface="+mn-lt"/>
+                <a:ea typeface="+mn-ea"/>
+                <a:cs typeface="+mn-cs"/>
+              </a:defRPr>
+            </a:lvl6pPr>
+            <a:lvl7pPr marL="2971800" indent="-228600" algn="l" defTabSz="914400" rtl="0" eaLnBrk="1" latinLnBrk="0" hangingPunct="1">
+              <a:lnSpc>
+                <a:spcPct val="90000"/>
+              </a:lnSpc>
+              <a:spcBef>
+                <a:spcPts val="500"/>
+              </a:spcBef>
+              <a:buFont typeface="Arial" panose="020B0604020202020204" pitchFamily="34" charset="0"/>
+              <a:buChar char="•"/>
+              <a:defRPr sz="1800" kern="1200">
+                <a:solidFill>
+                  <a:schemeClr val="tx1"/>
+                </a:solidFill>
+                <a:latin typeface="+mn-lt"/>
+                <a:ea typeface="+mn-ea"/>
+                <a:cs typeface="+mn-cs"/>
+              </a:defRPr>
+            </a:lvl7pPr>
+            <a:lvl8pPr marL="3429000" indent="-228600" algn="l" defTabSz="914400" rtl="0" eaLnBrk="1" latinLnBrk="0" hangingPunct="1">
+              <a:lnSpc>
+                <a:spcPct val="90000"/>
+              </a:lnSpc>
+              <a:spcBef>
+                <a:spcPts val="500"/>
+              </a:spcBef>
+              <a:buFont typeface="Arial" panose="020B0604020202020204" pitchFamily="34" charset="0"/>
+              <a:buChar char="•"/>
+              <a:defRPr sz="1800" kern="1200">
+                <a:solidFill>
+                  <a:schemeClr val="tx1"/>
+                </a:solidFill>
+                <a:latin typeface="+mn-lt"/>
+                <a:ea typeface="+mn-ea"/>
+                <a:cs typeface="+mn-cs"/>
+              </a:defRPr>
+            </a:lvl8pPr>
+            <a:lvl9pPr marL="3886200" indent="-228600" algn="l" defTabSz="914400" rtl="0" eaLnBrk="1" latinLnBrk="0" hangingPunct="1">
+              <a:lnSpc>
+                <a:spcPct val="90000"/>
+              </a:lnSpc>
+              <a:spcBef>
+                <a:spcPts val="500"/>
+              </a:spcBef>
+              <a:buFont typeface="Arial" panose="020B0604020202020204" pitchFamily="34" charset="0"/>
+              <a:buChar char="•"/>
+              <a:defRPr sz="1800" kern="1200">
+                <a:solidFill>
+                  <a:schemeClr val="tx1"/>
+                </a:solidFill>
+                <a:latin typeface="+mn-lt"/>
+                <a:ea typeface="+mn-ea"/>
+                <a:cs typeface="+mn-cs"/>
+              </a:defRPr>
+            </a:lvl9pPr>
+          </a:lstStyle>
+          <a:p>
+            <a:r>
+              <a:rPr lang="de-DE" dirty="0">
+                <a:cs typeface="Arial"/>
+              </a:rPr>
+              <a:t>Normal</a:t>
+            </a:r>
+            <a:endParaRPr lang="de-DE" dirty="0"/>
+          </a:p>
+        </p:txBody>
+      </p:sp>
+      <p:pic>
+        <p:nvPicPr>
+          <p:cNvPr id="4" name="Grafik 3" descr="Ein Bild, das Text, Diagramm, Reihe, parallel enthält.&#10;&#10;Automatisch generierte Beschreibung">
+            <a:extLst>
+              <a:ext uri="{FF2B5EF4-FFF2-40B4-BE49-F238E27FC236}">
+                <a16:creationId xmlns:a16="http://schemas.microsoft.com/office/drawing/2014/main" id="{3E31BEB1-AA77-05D3-ED55-505442C1DCFE}"/>
+              </a:ext>
+            </a:extLst>
+          </p:cNvPr>
+          <p:cNvPicPr>
+            <a:picLocks noChangeAspect="1"/>
+          </p:cNvPicPr>
+          <p:nvPr/>
+        </p:nvPicPr>
+        <p:blipFill>
+          <a:blip r:embed="rId2">
+            <a:extLst>
+              <a:ext uri="{28A0092B-C50C-407E-A947-70E740481C1C}">
+                <a14:useLocalDpi xmlns:a14="http://schemas.microsoft.com/office/drawing/2010/main" val="0"/>
+              </a:ext>
+            </a:extLst>
+          </a:blip>
+          <a:stretch>
+            <a:fillRect/>
+          </a:stretch>
+        </p:blipFill>
+        <p:spPr>
+          <a:xfrm>
+            <a:off x="1932317" y="1491890"/>
+            <a:ext cx="7056407" cy="4704272"/>
+          </a:xfrm>
+          <a:prstGeom prst="rect">
+            <a:avLst/>
+          </a:prstGeom>
+        </p:spPr>
+      </p:pic>
+      <p:sp>
+        <p:nvSpPr>
+          <p:cNvPr id="5" name="Sprechblase: oval 4">
+            <a:extLst>
+              <a:ext uri="{FF2B5EF4-FFF2-40B4-BE49-F238E27FC236}">
+                <a16:creationId xmlns:a16="http://schemas.microsoft.com/office/drawing/2014/main" id="{F36339CA-7BE7-611B-A222-62F32ED35BF0}"/>
+              </a:ext>
+            </a:extLst>
+          </p:cNvPr>
+          <p:cNvSpPr/>
+          <p:nvPr/>
+        </p:nvSpPr>
+        <p:spPr bwMode="auto">
+          <a:xfrm>
+            <a:off x="8246853" y="1608873"/>
+            <a:ext cx="1431986" cy="346234"/>
+          </a:xfrm>
+          <a:prstGeom prst="wedgeEllipseCallout">
+            <a:avLst>
+              <a:gd name="adj1" fmla="val -61489"/>
+              <a:gd name="adj2" fmla="val 121529"/>
+            </a:avLst>
+          </a:prstGeom>
+          <a:ln/>
+        </p:spPr>
+        <p:style>
+          <a:lnRef idx="2">
+            <a:schemeClr val="accent2"/>
+          </a:lnRef>
+          <a:fillRef idx="1">
+            <a:schemeClr val="lt1"/>
+          </a:fillRef>
+          <a:effectRef idx="0">
+            <a:schemeClr val="accent2"/>
+          </a:effectRef>
+          <a:fontRef idx="minor">
+            <a:schemeClr val="dk1"/>
+          </a:fontRef>
+        </p:style>
+        <p:txBody>
+          <a:bodyPr vert="horz" wrap="square" lIns="91440" tIns="45720" rIns="91440" bIns="45720" numCol="1" rtlCol="0" anchor="ctr" anchorCtr="0" compatLnSpc="1">
+            <a:prstTxWarp prst="textNoShape">
+              <a:avLst/>
+            </a:prstTxWarp>
+            <a:spAutoFit/>
+          </a:bodyPr>
+          <a:lstStyle/>
+          <a:p>
+            <a:pPr marL="0" marR="0" indent="0" algn="l" defTabSz="914400" rtl="0" eaLnBrk="0" fontAlgn="base" latinLnBrk="0" hangingPunct="0">
+              <a:lnSpc>
+                <a:spcPct val="100000"/>
+              </a:lnSpc>
+              <a:spcBef>
+                <a:spcPct val="0"/>
+              </a:spcBef>
+              <a:spcAft>
+                <a:spcPct val="0"/>
+              </a:spcAft>
+              <a:buClrTx/>
+              <a:buSzTx/>
+              <a:buFontTx/>
+              <a:buNone/>
+              <a:tabLst/>
+            </a:pPr>
+            <a:r>
+              <a:rPr kumimoji="0" lang="de-DE" sz="1000" b="1" i="0" u="none" strike="noStrike" cap="none" normalizeH="0" baseline="0" dirty="0">
+                <a:ln>
+                  <a:noFill/>
+                </a:ln>
+                <a:solidFill>
+                  <a:srgbClr val="000080"/>
+                </a:solidFill>
+                <a:effectLst/>
+                <a:latin typeface="Consolas" panose="020B0609020204030204" pitchFamily="49" charset="0"/>
+              </a:rPr>
+              <a:t>Läuft noch!</a:t>
+            </a:r>
+          </a:p>
+        </p:txBody>
+      </p:sp>
+    </p:spTree>
+    <p:extLst>
+      <p:ext uri="{BB962C8B-B14F-4D97-AF65-F5344CB8AC3E}">
+        <p14:creationId xmlns:p14="http://schemas.microsoft.com/office/powerpoint/2010/main" val="4290964015"/>
+      </p:ext>
+    </p:extLst>
+  </p:cSld>
+  <p:clrMapOvr>
+    <a:masterClrMapping/>
+  </p:clrMapOvr>
+  <mc:AlternateContent xmlns:mc="http://schemas.openxmlformats.org/markup-compatibility/2006">
+    <mc:Choice xmlns:p14="http://schemas.microsoft.com/office/powerpoint/2010/main" Requires="p14">
+      <p:transition spd="med" p14:dur="700">
+        <p:fade/>
+      </p:transition>
+    </mc:Choice>
+    <mc:Fallback>
+      <p:transition spd="med">
+        <p:fade/>
+      </p:transition>
+    </mc:Fallback>
+  </mc:AlternateContent>
+</p:sld>
+</file>
+
 <file path=ppt/slides/slide2.xml><?xml version="1.0" encoding="utf-8"?>
 <p:sld xmlns:a="http://schemas.openxmlformats.org/drawingml/2006/main" xmlns:r="http://schemas.openxmlformats.org/officeDocument/2006/relationships" xmlns:p="http://schemas.openxmlformats.org/presentationml/2006/main">
   <p:cSld>
@@ -22678,14 +24036,12 @@
 </file>
 
 <file path=customXml/item1.xml><?xml version="1.0" encoding="utf-8"?>
-<p:properties xmlns:p="http://schemas.microsoft.com/office/2006/metadata/properties" xmlns:xsi="http://www.w3.org/2001/XMLSchema-instance" xmlns:pc="http://schemas.microsoft.com/office/infopath/2007/PartnerControls">
-  <documentManagement>
-    <TaxCatchAll xmlns="4b1e1a4f-2377-48af-bcc8-9af2baee2b08" xsi:nil="true"/>
-    <lcf76f155ced4ddcb4097134ff3c332f xmlns="c97131b6-b26a-4299-b9b1-d0cf4861edc3">
-      <Terms xmlns="http://schemas.microsoft.com/office/infopath/2007/PartnerControls"/>
-    </lcf76f155ced4ddcb4097134ff3c332f>
-  </documentManagement>
-</p:properties>
+<?mso-contentType ?>
+<FormTemplates xmlns="http://schemas.microsoft.com/sharepoint/v3/contenttype/forms">
+  <Display>DocumentLibraryForm</Display>
+  <Edit>DocumentLibraryForm</Edit>
+  <New>DocumentLibraryForm</New>
+</FormTemplates>
 </file>
 
 <file path=customXml/item2.xml><?xml version="1.0" encoding="utf-8"?>
@@ -22906,28 +24262,20 @@
 </file>
 
 <file path=customXml/item3.xml><?xml version="1.0" encoding="utf-8"?>
-<?mso-contentType ?>
-<FormTemplates xmlns="http://schemas.microsoft.com/sharepoint/v3/contenttype/forms">
-  <Display>DocumentLibraryForm</Display>
-  <Edit>DocumentLibraryForm</Edit>
-  <New>DocumentLibraryForm</New>
-</FormTemplates>
+<p:properties xmlns:p="http://schemas.microsoft.com/office/2006/metadata/properties" xmlns:xsi="http://www.w3.org/2001/XMLSchema-instance" xmlns:pc="http://schemas.microsoft.com/office/infopath/2007/PartnerControls">
+  <documentManagement>
+    <TaxCatchAll xmlns="4b1e1a4f-2377-48af-bcc8-9af2baee2b08" xsi:nil="true"/>
+    <lcf76f155ced4ddcb4097134ff3c332f xmlns="c97131b6-b26a-4299-b9b1-d0cf4861edc3">
+      <Terms xmlns="http://schemas.microsoft.com/office/infopath/2007/PartnerControls"/>
+    </lcf76f155ced4ddcb4097134ff3c332f>
+  </documentManagement>
+</p:properties>
 </file>
 
 <file path=customXml/itemProps1.xml><?xml version="1.0" encoding="utf-8"?>
-<ds:datastoreItem xmlns:ds="http://schemas.openxmlformats.org/officeDocument/2006/customXml" ds:itemID="{E2A36512-C1E6-43EE-BD5D-DEC9E86C5B95}">
+<ds:datastoreItem xmlns:ds="http://schemas.openxmlformats.org/officeDocument/2006/customXml" ds:itemID="{FF726691-6D1E-4E2F-AD19-E9CA8464D57D}">
   <ds:schemaRefs>
-    <ds:schemaRef ds:uri="http://schemas.microsoft.com/office/2006/metadata/properties"/>
-    <ds:schemaRef ds:uri="http://schemas.microsoft.com/office/2006/documentManagement/types"/>
-    <ds:schemaRef ds:uri="http://schemas.openxmlformats.org/package/2006/metadata/core-properties"/>
-    <ds:schemaRef ds:uri="http://www.w3.org/XML/1998/namespace"/>
-    <ds:schemaRef ds:uri="http://purl.org/dc/elements/1.1/"/>
-    <ds:schemaRef ds:uri="http://purl.org/dc/dcmitype/"/>
-    <ds:schemaRef ds:uri="http://schemas.microsoft.com/office/infopath/2007/PartnerControls"/>
-    <ds:schemaRef ds:uri="8538ef83-fabc-4966-af15-44c995b00f27"/>
-    <ds:schemaRef ds:uri="http://purl.org/dc/terms/"/>
-    <ds:schemaRef ds:uri="4b1e1a4f-2377-48af-bcc8-9af2baee2b08"/>
-    <ds:schemaRef ds:uri="c97131b6-b26a-4299-b9b1-d0cf4861edc3"/>
+    <ds:schemaRef ds:uri="http://schemas.microsoft.com/sharepoint/v3/contenttype/forms"/>
   </ds:schemaRefs>
 </ds:datastoreItem>
 </file>
@@ -22952,9 +24300,19 @@
 </file>
 
 <file path=customXml/itemProps3.xml><?xml version="1.0" encoding="utf-8"?>
-<ds:datastoreItem xmlns:ds="http://schemas.openxmlformats.org/officeDocument/2006/customXml" ds:itemID="{FF726691-6D1E-4E2F-AD19-E9CA8464D57D}">
+<ds:datastoreItem xmlns:ds="http://schemas.openxmlformats.org/officeDocument/2006/customXml" ds:itemID="{E2A36512-C1E6-43EE-BD5D-DEC9E86C5B95}">
   <ds:schemaRefs>
-    <ds:schemaRef ds:uri="http://schemas.microsoft.com/sharepoint/v3/contenttype/forms"/>
+    <ds:schemaRef ds:uri="http://schemas.microsoft.com/office/2006/metadata/properties"/>
+    <ds:schemaRef ds:uri="http://schemas.microsoft.com/office/2006/documentManagement/types"/>
+    <ds:schemaRef ds:uri="http://schemas.openxmlformats.org/package/2006/metadata/core-properties"/>
+    <ds:schemaRef ds:uri="http://www.w3.org/XML/1998/namespace"/>
+    <ds:schemaRef ds:uri="http://purl.org/dc/elements/1.1/"/>
+    <ds:schemaRef ds:uri="http://purl.org/dc/dcmitype/"/>
+    <ds:schemaRef ds:uri="http://schemas.microsoft.com/office/infopath/2007/PartnerControls"/>
+    <ds:schemaRef ds:uri="8538ef83-fabc-4966-af15-44c995b00f27"/>
+    <ds:schemaRef ds:uri="http://purl.org/dc/terms/"/>
+    <ds:schemaRef ds:uri="4b1e1a4f-2377-48af-bcc8-9af2baee2b08"/>
+    <ds:schemaRef ds:uri="c97131b6-b26a-4299-b9b1-d0cf4861edc3"/>
   </ds:schemaRefs>
 </ds:datastoreItem>
 </file>
</xml_diff>